<commit_message>
parse for bold text style
</commit_message>
<xml_diff>
--- a/luna_authoring_system/test/test_assets/1 textbox from placeholder in slide layout.pptx
+++ b/luna_authoring_system/test/test_assets/1 textbox from placeholder in slide layout.pptx
@@ -784,7 +784,7 @@
           <a:lstStyle>
             <a:lvl1pPr marL="0" indent="0">
               <a:buNone/>
-              <a:defRPr sz="2000"/>
+              <a:defRPr sz="2000" b="1"/>
             </a:lvl1pPr>
           </a:lstStyle>
           <a:p>
@@ -3420,10 +3420,9 @@
           <a:lstStyle/>
           <a:p>
             <a:r>
-              <a:rPr lang="en-US"/>
+              <a:rPr lang="en-US" dirty="0"/>
               <a:t>Hello World</a:t>
             </a:r>
-            <a:endParaRPr lang="en-US" dirty="0"/>
           </a:p>
         </p:txBody>
       </p:sp>

</xml_diff>